<commit_message>
adding wednesday's regex material and additions to hall of fame
</commit_message>
<xml_diff>
--- a/week4/week 4 - tuesday.pptx
+++ b/week4/week 4 - tuesday.pptx
@@ -19,8 +19,11 @@
     <p:sldId id="267" r:id="rId13"/>
     <p:sldId id="268" r:id="rId14"/>
     <p:sldId id="271" r:id="rId15"/>
-    <p:sldId id="269" r:id="rId16"/>
-    <p:sldId id="270" r:id="rId17"/>
+    <p:sldId id="272" r:id="rId16"/>
+    <p:sldId id="274" r:id="rId17"/>
+    <p:sldId id="275" r:id="rId18"/>
+    <p:sldId id="276" r:id="rId19"/>
+    <p:sldId id="273" r:id="rId20"/>
   </p:sldIdLst>
   <p:sldSz cx="9144000" cy="6858000" type="screen4x3"/>
   <p:notesSz cx="6858000" cy="9144000"/>
@@ -3286,6 +3289,13 @@
   <p:clrMapOvr>
     <a:masterClrMapping/>
   </p:clrMapOvr>
+  <p:timing>
+    <p:tnLst>
+      <p:par>
+        <p:cTn xmlns:p14="http://schemas.microsoft.com/office/powerpoint/2010/main" id="1" dur="indefinite" restart="never" nodeType="tmRoot"/>
+      </p:par>
+    </p:tnLst>
+  </p:timing>
 </p:sld>
 </file>
 
@@ -3389,6 +3399,13 @@
   <p:clrMapOvr>
     <a:masterClrMapping/>
   </p:clrMapOvr>
+  <p:timing>
+    <p:tnLst>
+      <p:par>
+        <p:cTn xmlns:p14="http://schemas.microsoft.com/office/powerpoint/2010/main" id="1" dur="indefinite" restart="never" nodeType="tmRoot"/>
+      </p:par>
+    </p:tnLst>
+  </p:timing>
 </p:sld>
 </file>
 
@@ -3500,6 +3517,13 @@
   <p:clrMapOvr>
     <a:masterClrMapping/>
   </p:clrMapOvr>
+  <p:timing>
+    <p:tnLst>
+      <p:par>
+        <p:cTn xmlns:p14="http://schemas.microsoft.com/office/powerpoint/2010/main" id="1" dur="indefinite" restart="never" nodeType="tmRoot"/>
+      </p:par>
+    </p:tnLst>
+  </p:timing>
 </p:sld>
 </file>
 
@@ -3642,6 +3666,13 @@
   <p:clrMapOvr>
     <a:masterClrMapping/>
   </p:clrMapOvr>
+  <p:timing>
+    <p:tnLst>
+      <p:par>
+        <p:cTn xmlns:p14="http://schemas.microsoft.com/office/powerpoint/2010/main" id="1" dur="indefinite" restart="never" nodeType="tmRoot"/>
+      </p:par>
+    </p:tnLst>
+  </p:timing>
 </p:sld>
 </file>
 
@@ -3731,6 +3762,13 @@
   <p:clrMapOvr>
     <a:masterClrMapping/>
   </p:clrMapOvr>
+  <p:timing>
+    <p:tnLst>
+      <p:par>
+        <p:cTn xmlns:p14="http://schemas.microsoft.com/office/powerpoint/2010/main" id="1" dur="indefinite" restart="never" nodeType="tmRoot"/>
+      </p:par>
+    </p:tnLst>
+  </p:timing>
 </p:sld>
 </file>
 
@@ -3846,6 +3884,13 @@
   <p:clrMapOvr>
     <a:masterClrMapping/>
   </p:clrMapOvr>
+  <p:timing>
+    <p:tnLst>
+      <p:par>
+        <p:cTn xmlns:p14="http://schemas.microsoft.com/office/powerpoint/2010/main" id="1" dur="indefinite" restart="never" nodeType="tmRoot"/>
+      </p:par>
+    </p:tnLst>
+  </p:timing>
 </p:sld>
 </file>
 
@@ -3883,40 +3928,66 @@
           <a:p>
             <a:r>
               <a:rPr lang="en-US" dirty="0" smtClean="0"/>
-              <a:t>Pulling Data</a:t>
+              <a:t>Mitigation</a:t>
             </a:r>
             <a:endParaRPr lang="en-US" dirty="0"/>
           </a:p>
         </p:txBody>
       </p:sp>
-      <p:pic>
-        <p:nvPicPr>
-          <p:cNvPr id="5" name="Picture 4"/>
-          <p:cNvPicPr>
-            <a:picLocks noChangeAspect="1"/>
-          </p:cNvPicPr>
-          <p:nvPr/>
-        </p:nvPicPr>
-        <p:blipFill>
-          <a:blip r:embed="rId2"/>
-          <a:stretch>
-            <a:fillRect/>
-          </a:stretch>
-        </p:blipFill>
-        <p:spPr>
-          <a:xfrm>
-            <a:off x="1711427" y="946830"/>
-            <a:ext cx="6574221" cy="5411928"/>
-          </a:xfrm>
-          <a:prstGeom prst="rect">
-            <a:avLst/>
-          </a:prstGeom>
-        </p:spPr>
-      </p:pic>
+      <p:sp>
+        <p:nvSpPr>
+          <p:cNvPr id="3" name="Content Placeholder 2"/>
+          <p:cNvSpPr>
+            <a:spLocks noGrp="1"/>
+          </p:cNvSpPr>
+          <p:nvPr>
+            <p:ph idx="1"/>
+          </p:nvPr>
+        </p:nvSpPr>
+        <p:spPr/>
+        <p:txBody>
+          <a:bodyPr>
+            <a:normAutofit fontScale="92500" lnSpcReduction="10000"/>
+          </a:bodyPr>
+          <a:lstStyle/>
+          <a:p>
+            <a:r>
+              <a:rPr lang="en-US" dirty="0" smtClean="0"/>
+              <a:t>Parameterized Queries (aka prepared statements)</a:t>
+            </a:r>
+          </a:p>
+          <a:p>
+            <a:r>
+              <a:rPr lang="en-US" dirty="0" smtClean="0"/>
+              <a:t>First define the SQL code, then pass in the parameters later</a:t>
+            </a:r>
+          </a:p>
+          <a:p>
+            <a:r>
+              <a:rPr lang="en-US" dirty="0" smtClean="0"/>
+              <a:t>Allows </a:t>
+            </a:r>
+            <a:r>
+              <a:rPr lang="en-US" dirty="0"/>
+              <a:t>the database to distinguish between code and data, regardless of what user input is </a:t>
+            </a:r>
+            <a:r>
+              <a:rPr lang="en-US" dirty="0" smtClean="0"/>
+              <a:t>supplied</a:t>
+            </a:r>
+          </a:p>
+          <a:p>
+            <a:r>
+              <a:rPr lang="en-US" dirty="0"/>
+              <a:t>Prepared statements ensure that an attacker is not able to change the intent of a query, even if SQL commands are inserted by an attacker</a:t>
+            </a:r>
+          </a:p>
+        </p:txBody>
+      </p:sp>
     </p:spTree>
     <p:extLst>
       <p:ext uri="{BB962C8B-B14F-4D97-AF65-F5344CB8AC3E}">
-        <p14:creationId xmlns:p14="http://schemas.microsoft.com/office/powerpoint/2010/main" val="3187185683"/>
+        <p14:creationId xmlns:p14="http://schemas.microsoft.com/office/powerpoint/2010/main" val="3248689532"/>
       </p:ext>
     </p:extLst>
   </p:cSld>
@@ -3958,7 +4029,11 @@
           <a:bodyPr/>
           <a:lstStyle/>
           <a:p>
-            <a:endParaRPr lang="en-US"/>
+            <a:r>
+              <a:rPr lang="en-US" dirty="0" smtClean="0"/>
+              <a:t>Mitigation Example – ASP.NET</a:t>
+            </a:r>
+            <a:endParaRPr lang="en-US" dirty="0"/>
           </a:p>
         </p:txBody>
       </p:sp>
@@ -3974,21 +4049,807 @@
         </p:nvSpPr>
         <p:spPr/>
         <p:txBody>
-          <a:bodyPr/>
-          <a:lstStyle/>
-          <a:p>
-            <a:r>
-              <a:rPr lang="en-US" dirty="0" smtClean="0"/>
-              <a:t>Union queries</a:t>
-            </a:r>
+          <a:bodyPr>
+            <a:normAutofit/>
+          </a:bodyPr>
+          <a:lstStyle/>
+          <a:p>
             <a:endParaRPr lang="en-US" dirty="0"/>
+          </a:p>
+          <a:p>
+            <a:pPr marL="0" indent="0">
+              <a:buNone/>
+            </a:pPr>
+            <a:r>
+              <a:rPr lang="en-US" sz="1400" dirty="0">
+                <a:latin typeface="Consolas"/>
+                <a:cs typeface="Consolas"/>
+              </a:rPr>
+              <a:t>string </a:t>
+            </a:r>
+            <a:r>
+              <a:rPr lang="en-US" sz="1400" dirty="0" err="1">
+                <a:latin typeface="Consolas"/>
+                <a:cs typeface="Consolas"/>
+              </a:rPr>
+              <a:t>sql</a:t>
+            </a:r>
+            <a:r>
+              <a:rPr lang="en-US" sz="1400" dirty="0">
+                <a:latin typeface="Consolas"/>
+                <a:cs typeface="Consolas"/>
+              </a:rPr>
+              <a:t> = "SELECT * FROM Customers WHERE </a:t>
+            </a:r>
+            <a:r>
+              <a:rPr lang="en-US" sz="1400" dirty="0" err="1">
+                <a:latin typeface="Consolas"/>
+                <a:cs typeface="Consolas"/>
+              </a:rPr>
+              <a:t>CustomerId</a:t>
+            </a:r>
+            <a:r>
+              <a:rPr lang="en-US" sz="1400" dirty="0">
+                <a:latin typeface="Consolas"/>
+                <a:cs typeface="Consolas"/>
+              </a:rPr>
+              <a:t> = @</a:t>
+            </a:r>
+            <a:r>
+              <a:rPr lang="en-US" sz="1400" dirty="0" err="1">
+                <a:latin typeface="Consolas"/>
+                <a:cs typeface="Consolas"/>
+              </a:rPr>
+              <a:t>CustomerId</a:t>
+            </a:r>
+            <a:r>
+              <a:rPr lang="en-US" sz="1400" dirty="0">
+                <a:latin typeface="Consolas"/>
+                <a:cs typeface="Consolas"/>
+              </a:rPr>
+              <a:t>";</a:t>
+            </a:r>
+          </a:p>
+          <a:p>
+            <a:pPr marL="0" indent="0">
+              <a:buNone/>
+            </a:pPr>
+            <a:r>
+              <a:rPr lang="en-US" sz="1400" dirty="0" err="1">
+                <a:latin typeface="Consolas"/>
+                <a:cs typeface="Consolas"/>
+              </a:rPr>
+              <a:t>SqlCommand</a:t>
+            </a:r>
+            <a:r>
+              <a:rPr lang="en-US" sz="1400" dirty="0">
+                <a:latin typeface="Consolas"/>
+                <a:cs typeface="Consolas"/>
+              </a:rPr>
+              <a:t> command = new </a:t>
+            </a:r>
+            <a:r>
+              <a:rPr lang="en-US" sz="1400" dirty="0" err="1">
+                <a:latin typeface="Consolas"/>
+                <a:cs typeface="Consolas"/>
+              </a:rPr>
+              <a:t>SqlCommand</a:t>
+            </a:r>
+            <a:r>
+              <a:rPr lang="en-US" sz="1400" dirty="0">
+                <a:latin typeface="Consolas"/>
+                <a:cs typeface="Consolas"/>
+              </a:rPr>
+              <a:t>(</a:t>
+            </a:r>
+            <a:r>
+              <a:rPr lang="en-US" sz="1400" dirty="0" err="1">
+                <a:latin typeface="Consolas"/>
+                <a:cs typeface="Consolas"/>
+              </a:rPr>
+              <a:t>sql</a:t>
+            </a:r>
+            <a:r>
+              <a:rPr lang="en-US" sz="1400" dirty="0">
+                <a:latin typeface="Consolas"/>
+                <a:cs typeface="Consolas"/>
+              </a:rPr>
+              <a:t>);</a:t>
+            </a:r>
+          </a:p>
+          <a:p>
+            <a:pPr marL="0" indent="0">
+              <a:buNone/>
+            </a:pPr>
+            <a:r>
+              <a:rPr lang="en-US" sz="1400" dirty="0" err="1">
+                <a:latin typeface="Consolas"/>
+                <a:cs typeface="Consolas"/>
+              </a:rPr>
+              <a:t>command.Parameters.Add</a:t>
+            </a:r>
+            <a:r>
+              <a:rPr lang="en-US" sz="1400" dirty="0">
+                <a:latin typeface="Consolas"/>
+                <a:cs typeface="Consolas"/>
+              </a:rPr>
+              <a:t>(new </a:t>
+            </a:r>
+            <a:r>
+              <a:rPr lang="en-US" sz="1400" dirty="0" err="1">
+                <a:latin typeface="Consolas"/>
+                <a:cs typeface="Consolas"/>
+              </a:rPr>
+              <a:t>SqlParameter</a:t>
+            </a:r>
+            <a:r>
+              <a:rPr lang="en-US" sz="1400" dirty="0">
+                <a:latin typeface="Consolas"/>
+                <a:cs typeface="Consolas"/>
+              </a:rPr>
+              <a:t>("@</a:t>
+            </a:r>
+            <a:r>
+              <a:rPr lang="en-US" sz="1400" dirty="0" err="1">
+                <a:latin typeface="Consolas"/>
+                <a:cs typeface="Consolas"/>
+              </a:rPr>
+              <a:t>CustomerId</a:t>
+            </a:r>
+            <a:r>
+              <a:rPr lang="en-US" sz="1400" dirty="0">
+                <a:latin typeface="Consolas"/>
+                <a:cs typeface="Consolas"/>
+              </a:rPr>
+              <a:t>", </a:t>
+            </a:r>
+            <a:r>
+              <a:rPr lang="en-US" sz="1400" dirty="0" err="1">
+                <a:latin typeface="Consolas"/>
+                <a:cs typeface="Consolas"/>
+              </a:rPr>
+              <a:t>System.Data.SqlDbType.Int</a:t>
+            </a:r>
+            <a:r>
+              <a:rPr lang="en-US" sz="1400" dirty="0">
+                <a:latin typeface="Consolas"/>
+                <a:cs typeface="Consolas"/>
+              </a:rPr>
+              <a:t>));</a:t>
+            </a:r>
+          </a:p>
+          <a:p>
+            <a:pPr marL="0" indent="0">
+              <a:buNone/>
+            </a:pPr>
+            <a:r>
+              <a:rPr lang="en-US" sz="1400" dirty="0" err="1">
+                <a:latin typeface="Consolas"/>
+                <a:cs typeface="Consolas"/>
+              </a:rPr>
+              <a:t>command.Parameters</a:t>
+            </a:r>
+            <a:r>
+              <a:rPr lang="en-US" sz="1400" dirty="0">
+                <a:latin typeface="Consolas"/>
+                <a:cs typeface="Consolas"/>
+              </a:rPr>
+              <a:t>["@</a:t>
+            </a:r>
+            <a:r>
+              <a:rPr lang="en-US" sz="1400" dirty="0" err="1">
+                <a:latin typeface="Consolas"/>
+                <a:cs typeface="Consolas"/>
+              </a:rPr>
+              <a:t>CustomerId</a:t>
+            </a:r>
+            <a:r>
+              <a:rPr lang="en-US" sz="1400" dirty="0">
+                <a:latin typeface="Consolas"/>
+                <a:cs typeface="Consolas"/>
+              </a:rPr>
+              <a:t>"].Value = 1;</a:t>
+            </a:r>
           </a:p>
         </p:txBody>
       </p:sp>
     </p:spTree>
     <p:extLst>
       <p:ext uri="{BB962C8B-B14F-4D97-AF65-F5344CB8AC3E}">
-        <p14:creationId xmlns:p14="http://schemas.microsoft.com/office/powerpoint/2010/main" val="3932390839"/>
+        <p14:creationId xmlns:p14="http://schemas.microsoft.com/office/powerpoint/2010/main" val="2117865737"/>
+      </p:ext>
+    </p:extLst>
+  </p:cSld>
+  <p:clrMapOvr>
+    <a:masterClrMapping/>
+  </p:clrMapOvr>
+</p:sld>
+</file>
+
+<file path=ppt/slides/slide17.xml><?xml version="1.0" encoding="utf-8"?>
+<p:sld xmlns:a="http://schemas.openxmlformats.org/drawingml/2006/main" xmlns:r="http://schemas.openxmlformats.org/officeDocument/2006/relationships" xmlns:p="http://schemas.openxmlformats.org/presentationml/2006/main">
+  <p:cSld>
+    <p:spTree>
+      <p:nvGrpSpPr>
+        <p:cNvPr id="1" name=""/>
+        <p:cNvGrpSpPr/>
+        <p:nvPr/>
+      </p:nvGrpSpPr>
+      <p:grpSpPr>
+        <a:xfrm>
+          <a:off x="0" y="0"/>
+          <a:ext cx="0" cy="0"/>
+          <a:chOff x="0" y="0"/>
+          <a:chExt cx="0" cy="0"/>
+        </a:xfrm>
+      </p:grpSpPr>
+      <p:sp>
+        <p:nvSpPr>
+          <p:cNvPr id="2" name="Title 1"/>
+          <p:cNvSpPr>
+            <a:spLocks noGrp="1"/>
+          </p:cNvSpPr>
+          <p:nvPr>
+            <p:ph type="title"/>
+          </p:nvPr>
+        </p:nvSpPr>
+        <p:spPr/>
+        <p:txBody>
+          <a:bodyPr/>
+          <a:lstStyle/>
+          <a:p>
+            <a:r>
+              <a:rPr lang="en-US" dirty="0" smtClean="0"/>
+              <a:t>Mitigation Example - Ruby</a:t>
+            </a:r>
+            <a:endParaRPr lang="en-US" dirty="0"/>
+          </a:p>
+        </p:txBody>
+      </p:sp>
+      <p:sp>
+        <p:nvSpPr>
+          <p:cNvPr id="3" name="Content Placeholder 2"/>
+          <p:cNvSpPr>
+            <a:spLocks noGrp="1"/>
+          </p:cNvSpPr>
+          <p:nvPr>
+            <p:ph idx="1"/>
+          </p:nvPr>
+        </p:nvSpPr>
+        <p:spPr/>
+        <p:txBody>
+          <a:bodyPr>
+            <a:normAutofit/>
+          </a:bodyPr>
+          <a:lstStyle/>
+          <a:p>
+            <a:pPr marL="0" indent="0">
+              <a:buNone/>
+            </a:pPr>
+            <a:r>
+              <a:rPr lang="en-US" sz="2000" dirty="0" err="1">
+                <a:latin typeface="Consolas"/>
+                <a:cs typeface="Consolas"/>
+              </a:rPr>
+              <a:t>insert_new_user</a:t>
+            </a:r>
+            <a:r>
+              <a:rPr lang="en-US" sz="2000" dirty="0">
+                <a:latin typeface="Consolas"/>
+                <a:cs typeface="Consolas"/>
+              </a:rPr>
+              <a:t> = </a:t>
+            </a:r>
+            <a:r>
+              <a:rPr lang="en-US" sz="2000" dirty="0" err="1">
+                <a:latin typeface="Consolas"/>
+                <a:cs typeface="Consolas"/>
+              </a:rPr>
+              <a:t>db.prepare</a:t>
+            </a:r>
+            <a:r>
+              <a:rPr lang="en-US" sz="2000" dirty="0">
+                <a:latin typeface="Consolas"/>
+                <a:cs typeface="Consolas"/>
+              </a:rPr>
+              <a:t> "INSERT INTO users (name, age, gender) VALUES (?, ? ,?)"</a:t>
+            </a:r>
+          </a:p>
+          <a:p>
+            <a:pPr marL="0" indent="0">
+              <a:buNone/>
+            </a:pPr>
+            <a:r>
+              <a:rPr lang="en-US" sz="2000" dirty="0" err="1">
+                <a:latin typeface="Consolas"/>
+                <a:cs typeface="Consolas"/>
+              </a:rPr>
+              <a:t>insert_new_user.execute</a:t>
+            </a:r>
+            <a:r>
+              <a:rPr lang="en-US" sz="2000" dirty="0">
+                <a:latin typeface="Consolas"/>
+                <a:cs typeface="Consolas"/>
+              </a:rPr>
+              <a:t> '</a:t>
+            </a:r>
+            <a:r>
+              <a:rPr lang="en-US" sz="2000" dirty="0" err="1">
+                <a:latin typeface="Consolas"/>
+                <a:cs typeface="Consolas"/>
+              </a:rPr>
+              <a:t>aizatto</a:t>
+            </a:r>
+            <a:r>
+              <a:rPr lang="en-US" sz="2000" dirty="0">
+                <a:latin typeface="Consolas"/>
+                <a:cs typeface="Consolas"/>
+              </a:rPr>
+              <a:t>', '20', 'male'</a:t>
+            </a:r>
+          </a:p>
+        </p:txBody>
+      </p:sp>
+    </p:spTree>
+    <p:extLst>
+      <p:ext uri="{BB962C8B-B14F-4D97-AF65-F5344CB8AC3E}">
+        <p14:creationId xmlns:p14="http://schemas.microsoft.com/office/powerpoint/2010/main" val="2390846695"/>
+      </p:ext>
+    </p:extLst>
+  </p:cSld>
+  <p:clrMapOvr>
+    <a:masterClrMapping/>
+  </p:clrMapOvr>
+</p:sld>
+</file>
+
+<file path=ppt/slides/slide18.xml><?xml version="1.0" encoding="utf-8"?>
+<p:sld xmlns:a="http://schemas.openxmlformats.org/drawingml/2006/main" xmlns:r="http://schemas.openxmlformats.org/officeDocument/2006/relationships" xmlns:p="http://schemas.openxmlformats.org/presentationml/2006/main">
+  <p:cSld>
+    <p:spTree>
+      <p:nvGrpSpPr>
+        <p:cNvPr id="1" name=""/>
+        <p:cNvGrpSpPr/>
+        <p:nvPr/>
+      </p:nvGrpSpPr>
+      <p:grpSpPr>
+        <a:xfrm>
+          <a:off x="0" y="0"/>
+          <a:ext cx="0" cy="0"/>
+          <a:chOff x="0" y="0"/>
+          <a:chExt cx="0" cy="0"/>
+        </a:xfrm>
+      </p:grpSpPr>
+      <p:sp>
+        <p:nvSpPr>
+          <p:cNvPr id="2" name="Title 1"/>
+          <p:cNvSpPr>
+            <a:spLocks noGrp="1"/>
+          </p:cNvSpPr>
+          <p:nvPr>
+            <p:ph type="title"/>
+          </p:nvPr>
+        </p:nvSpPr>
+        <p:spPr/>
+        <p:txBody>
+          <a:bodyPr/>
+          <a:lstStyle/>
+          <a:p>
+            <a:r>
+              <a:rPr lang="en-US" dirty="0" smtClean="0"/>
+              <a:t>Mitigation Example - Java</a:t>
+            </a:r>
+            <a:endParaRPr lang="en-US" dirty="0"/>
+          </a:p>
+        </p:txBody>
+      </p:sp>
+      <p:sp>
+        <p:nvSpPr>
+          <p:cNvPr id="3" name="Content Placeholder 2"/>
+          <p:cNvSpPr>
+            <a:spLocks noGrp="1"/>
+          </p:cNvSpPr>
+          <p:nvPr>
+            <p:ph idx="1"/>
+          </p:nvPr>
+        </p:nvSpPr>
+        <p:spPr/>
+        <p:txBody>
+          <a:bodyPr>
+            <a:normAutofit/>
+          </a:bodyPr>
+          <a:lstStyle/>
+          <a:p>
+            <a:pPr marL="0" indent="0">
+              <a:buNone/>
+            </a:pPr>
+            <a:r>
+              <a:rPr lang="en-US" sz="1400" dirty="0">
+                <a:latin typeface="Consolas"/>
+                <a:cs typeface="Consolas"/>
+              </a:rPr>
+              <a:t>String </a:t>
+            </a:r>
+            <a:r>
+              <a:rPr lang="en-US" sz="1400" dirty="0" err="1">
+                <a:latin typeface="Consolas"/>
+                <a:cs typeface="Consolas"/>
+              </a:rPr>
+              <a:t>custname</a:t>
+            </a:r>
+            <a:r>
+              <a:rPr lang="en-US" sz="1400" dirty="0">
+                <a:latin typeface="Consolas"/>
+                <a:cs typeface="Consolas"/>
+              </a:rPr>
+              <a:t> = </a:t>
+            </a:r>
+            <a:r>
+              <a:rPr lang="en-US" sz="1400" dirty="0" err="1">
+                <a:latin typeface="Consolas"/>
+                <a:cs typeface="Consolas"/>
+              </a:rPr>
+              <a:t>request.getParameter</a:t>
+            </a:r>
+            <a:r>
+              <a:rPr lang="en-US" sz="1400" dirty="0">
+                <a:latin typeface="Consolas"/>
+                <a:cs typeface="Consolas"/>
+              </a:rPr>
+              <a:t>("</a:t>
+            </a:r>
+            <a:r>
+              <a:rPr lang="en-US" sz="1400" dirty="0" err="1">
+                <a:latin typeface="Consolas"/>
+                <a:cs typeface="Consolas"/>
+              </a:rPr>
+              <a:t>customerName</a:t>
+            </a:r>
+            <a:r>
+              <a:rPr lang="en-US" sz="1400" dirty="0">
+                <a:latin typeface="Consolas"/>
+                <a:cs typeface="Consolas"/>
+              </a:rPr>
+              <a:t>"); </a:t>
+            </a:r>
+          </a:p>
+          <a:p>
+            <a:pPr marL="0" indent="0">
+              <a:buNone/>
+            </a:pPr>
+            <a:r>
+              <a:rPr lang="en-US" sz="1400" dirty="0">
+                <a:latin typeface="Consolas"/>
+                <a:cs typeface="Consolas"/>
+              </a:rPr>
+              <a:t>String query = "SELECT </a:t>
+            </a:r>
+            <a:r>
+              <a:rPr lang="en-US" sz="1400" dirty="0" err="1">
+                <a:latin typeface="Consolas"/>
+                <a:cs typeface="Consolas"/>
+              </a:rPr>
+              <a:t>account_balance</a:t>
+            </a:r>
+            <a:r>
+              <a:rPr lang="en-US" sz="1400" dirty="0">
+                <a:latin typeface="Consolas"/>
+                <a:cs typeface="Consolas"/>
+              </a:rPr>
+              <a:t> FROM </a:t>
+            </a:r>
+            <a:r>
+              <a:rPr lang="en-US" sz="1400" dirty="0" err="1">
+                <a:latin typeface="Consolas"/>
+                <a:cs typeface="Consolas"/>
+              </a:rPr>
+              <a:t>user_data</a:t>
+            </a:r>
+            <a:r>
+              <a:rPr lang="en-US" sz="1400" dirty="0">
+                <a:latin typeface="Consolas"/>
+                <a:cs typeface="Consolas"/>
+              </a:rPr>
+              <a:t> WHERE </a:t>
+            </a:r>
+            <a:r>
+              <a:rPr lang="en-US" sz="1400" dirty="0" err="1">
+                <a:latin typeface="Consolas"/>
+                <a:cs typeface="Consolas"/>
+              </a:rPr>
+              <a:t>user_name</a:t>
+            </a:r>
+            <a:r>
+              <a:rPr lang="en-US" sz="1400" dirty="0">
+                <a:latin typeface="Consolas"/>
+                <a:cs typeface="Consolas"/>
+              </a:rPr>
+              <a:t> = ? ";  </a:t>
+            </a:r>
+          </a:p>
+          <a:p>
+            <a:pPr marL="0" indent="0">
+              <a:buNone/>
+            </a:pPr>
+            <a:r>
+              <a:rPr lang="en-US" sz="1400" dirty="0" err="1">
+                <a:latin typeface="Consolas"/>
+                <a:cs typeface="Consolas"/>
+              </a:rPr>
+              <a:t>PreparedStatement</a:t>
+            </a:r>
+            <a:r>
+              <a:rPr lang="en-US" sz="1400" dirty="0">
+                <a:latin typeface="Consolas"/>
+                <a:cs typeface="Consolas"/>
+              </a:rPr>
+              <a:t> </a:t>
+            </a:r>
+            <a:r>
+              <a:rPr lang="en-US" sz="1400" dirty="0" err="1">
+                <a:latin typeface="Consolas"/>
+                <a:cs typeface="Consolas"/>
+              </a:rPr>
+              <a:t>pstmt</a:t>
+            </a:r>
+            <a:r>
+              <a:rPr lang="en-US" sz="1400" dirty="0">
+                <a:latin typeface="Consolas"/>
+                <a:cs typeface="Consolas"/>
+              </a:rPr>
+              <a:t> = </a:t>
+            </a:r>
+            <a:r>
+              <a:rPr lang="en-US" sz="1400" dirty="0" err="1">
+                <a:latin typeface="Consolas"/>
+                <a:cs typeface="Consolas"/>
+              </a:rPr>
+              <a:t>connection.prepareStatement</a:t>
+            </a:r>
+            <a:r>
+              <a:rPr lang="en-US" sz="1400" dirty="0" smtClean="0">
+                <a:latin typeface="Consolas"/>
+                <a:cs typeface="Consolas"/>
+              </a:rPr>
+              <a:t>(query)</a:t>
+            </a:r>
+            <a:r>
+              <a:rPr lang="en-US" sz="1400" dirty="0">
+                <a:latin typeface="Consolas"/>
+                <a:cs typeface="Consolas"/>
+              </a:rPr>
+              <a:t>;</a:t>
+            </a:r>
+          </a:p>
+          <a:p>
+            <a:pPr marL="0" indent="0">
+              <a:buNone/>
+            </a:pPr>
+            <a:r>
+              <a:rPr lang="en-US" sz="1400" dirty="0" err="1">
+                <a:latin typeface="Consolas"/>
+                <a:cs typeface="Consolas"/>
+              </a:rPr>
+              <a:t>pstmt.setString</a:t>
+            </a:r>
+            <a:r>
+              <a:rPr lang="en-US" sz="1400" dirty="0" smtClean="0">
+                <a:latin typeface="Consolas"/>
+                <a:cs typeface="Consolas"/>
+              </a:rPr>
+              <a:t>(1</a:t>
+            </a:r>
+            <a:r>
+              <a:rPr lang="en-US" sz="1400" dirty="0">
+                <a:latin typeface="Consolas"/>
+                <a:cs typeface="Consolas"/>
+              </a:rPr>
+              <a:t>, </a:t>
+            </a:r>
+            <a:r>
+              <a:rPr lang="en-US" sz="1400" dirty="0" err="1">
+                <a:latin typeface="Consolas"/>
+                <a:cs typeface="Consolas"/>
+              </a:rPr>
+              <a:t>custname</a:t>
+            </a:r>
+            <a:r>
+              <a:rPr lang="en-US" sz="1400" dirty="0">
+                <a:latin typeface="Consolas"/>
+                <a:cs typeface="Consolas"/>
+              </a:rPr>
+              <a:t>); </a:t>
+            </a:r>
+          </a:p>
+          <a:p>
+            <a:pPr marL="0" indent="0">
+              <a:buNone/>
+            </a:pPr>
+            <a:r>
+              <a:rPr lang="en-US" sz="1400" dirty="0" err="1">
+                <a:latin typeface="Consolas"/>
+                <a:cs typeface="Consolas"/>
+              </a:rPr>
+              <a:t>ResultSet</a:t>
+            </a:r>
+            <a:r>
+              <a:rPr lang="en-US" sz="1400" dirty="0">
+                <a:latin typeface="Consolas"/>
+                <a:cs typeface="Consolas"/>
+              </a:rPr>
+              <a:t> results = </a:t>
+            </a:r>
+            <a:r>
+              <a:rPr lang="en-US" sz="1400" dirty="0" err="1">
+                <a:latin typeface="Consolas"/>
+                <a:cs typeface="Consolas"/>
+              </a:rPr>
+              <a:t>pstmt.executeQuery</a:t>
+            </a:r>
+            <a:r>
+              <a:rPr lang="en-US" sz="1400" dirty="0" smtClean="0">
+                <a:latin typeface="Consolas"/>
+                <a:cs typeface="Consolas"/>
+              </a:rPr>
+              <a:t>()</a:t>
+            </a:r>
+            <a:r>
+              <a:rPr lang="en-US" sz="1400" dirty="0">
+                <a:latin typeface="Consolas"/>
+                <a:cs typeface="Consolas"/>
+              </a:rPr>
+              <a:t>;</a:t>
+            </a:r>
+          </a:p>
+        </p:txBody>
+      </p:sp>
+    </p:spTree>
+    <p:extLst>
+      <p:ext uri="{BB962C8B-B14F-4D97-AF65-F5344CB8AC3E}">
+        <p14:creationId xmlns:p14="http://schemas.microsoft.com/office/powerpoint/2010/main" val="2567678664"/>
+      </p:ext>
+    </p:extLst>
+  </p:cSld>
+  <p:clrMapOvr>
+    <a:masterClrMapping/>
+  </p:clrMapOvr>
+</p:sld>
+</file>
+
+<file path=ppt/slides/slide19.xml><?xml version="1.0" encoding="utf-8"?>
+<p:sld xmlns:a="http://schemas.openxmlformats.org/drawingml/2006/main" xmlns:r="http://schemas.openxmlformats.org/officeDocument/2006/relationships" xmlns:p="http://schemas.openxmlformats.org/presentationml/2006/main">
+  <p:cSld>
+    <p:spTree>
+      <p:nvGrpSpPr>
+        <p:cNvPr id="1" name=""/>
+        <p:cNvGrpSpPr/>
+        <p:nvPr/>
+      </p:nvGrpSpPr>
+      <p:grpSpPr>
+        <a:xfrm>
+          <a:off x="0" y="0"/>
+          <a:ext cx="0" cy="0"/>
+          <a:chOff x="0" y="0"/>
+          <a:chExt cx="0" cy="0"/>
+        </a:xfrm>
+      </p:grpSpPr>
+      <p:sp>
+        <p:nvSpPr>
+          <p:cNvPr id="2" name="Title 1"/>
+          <p:cNvSpPr>
+            <a:spLocks noGrp="1"/>
+          </p:cNvSpPr>
+          <p:nvPr>
+            <p:ph type="title"/>
+          </p:nvPr>
+        </p:nvSpPr>
+        <p:spPr/>
+        <p:txBody>
+          <a:bodyPr/>
+          <a:lstStyle/>
+          <a:p>
+            <a:r>
+              <a:rPr lang="en-US" dirty="0" smtClean="0"/>
+              <a:t>Resources</a:t>
+            </a:r>
+            <a:endParaRPr lang="en-US" dirty="0"/>
+          </a:p>
+        </p:txBody>
+      </p:sp>
+      <p:sp>
+        <p:nvSpPr>
+          <p:cNvPr id="3" name="Content Placeholder 2"/>
+          <p:cNvSpPr>
+            <a:spLocks noGrp="1"/>
+          </p:cNvSpPr>
+          <p:nvPr>
+            <p:ph idx="1"/>
+          </p:nvPr>
+        </p:nvSpPr>
+        <p:spPr/>
+        <p:txBody>
+          <a:bodyPr/>
+          <a:lstStyle/>
+          <a:p>
+            <a:r>
+              <a:rPr lang="en-US" dirty="0">
+                <a:hlinkClick r:id="rId2"/>
+              </a:rPr>
+              <a:t>https://www.owasp.org/index.php/</a:t>
+            </a:r>
+            <a:r>
+              <a:rPr lang="en-US" dirty="0" smtClean="0">
+                <a:hlinkClick r:id="rId2"/>
+              </a:rPr>
+              <a:t>Query_Parameterization_Cheat_Sheet</a:t>
+            </a:r>
+            <a:r>
+              <a:rPr lang="en-US" dirty="0" smtClean="0"/>
+              <a:t> </a:t>
+            </a:r>
+            <a:endParaRPr lang="en-US" dirty="0"/>
+          </a:p>
+          <a:p>
+            <a:r>
+              <a:rPr lang="en-US" dirty="0">
+                <a:hlinkClick r:id="rId3"/>
+              </a:rPr>
+              <a:t>http://blog.codinghorror.com/give-me-parameterized-sql-or-give-me-death</a:t>
+            </a:r>
+            <a:r>
+              <a:rPr lang="en-US" dirty="0" smtClean="0">
+                <a:hlinkClick r:id="rId3"/>
+              </a:rPr>
+              <a:t>/</a:t>
+            </a:r>
+            <a:r>
+              <a:rPr lang="en-US" dirty="0" smtClean="0"/>
+              <a:t> </a:t>
+            </a:r>
+          </a:p>
+          <a:p>
+            <a:r>
+              <a:rPr lang="en-US" dirty="0">
+                <a:hlinkClick r:id="rId4"/>
+              </a:rPr>
+              <a:t>http://pentestmonkey.net/category/cheat-sheet/sql-</a:t>
+            </a:r>
+            <a:r>
+              <a:rPr lang="en-US" dirty="0" smtClean="0">
+                <a:hlinkClick r:id="rId4"/>
+              </a:rPr>
+              <a:t>injection</a:t>
+            </a:r>
+            <a:r>
+              <a:rPr lang="en-US" dirty="0" smtClean="0"/>
+              <a:t> </a:t>
+            </a:r>
+          </a:p>
+          <a:p>
+            <a:r>
+              <a:rPr lang="en-US" dirty="0">
+                <a:hlinkClick r:id="rId5"/>
+              </a:rPr>
+              <a:t>http://www.unixwiz.net/techtips/sql-</a:t>
+            </a:r>
+            <a:r>
+              <a:rPr lang="en-US" dirty="0" smtClean="0">
+                <a:hlinkClick r:id="rId5"/>
+              </a:rPr>
+              <a:t>injection.html</a:t>
+            </a:r>
+            <a:r>
+              <a:rPr lang="en-US" dirty="0" smtClean="0"/>
+              <a:t> </a:t>
+            </a:r>
+            <a:endParaRPr lang="en-US" dirty="0"/>
+          </a:p>
+        </p:txBody>
+      </p:sp>
+    </p:spTree>
+    <p:extLst>
+      <p:ext uri="{BB962C8B-B14F-4D97-AF65-F5344CB8AC3E}">
+        <p14:creationId xmlns:p14="http://schemas.microsoft.com/office/powerpoint/2010/main" val="2363640106"/>
       </p:ext>
     </p:extLst>
   </p:cSld>
@@ -4095,6 +4956,13 @@
   <p:clrMapOvr>
     <a:masterClrMapping/>
   </p:clrMapOvr>
+  <p:timing>
+    <p:tnLst>
+      <p:par>
+        <p:cTn xmlns:p14="http://schemas.microsoft.com/office/powerpoint/2010/main" id="1" dur="indefinite" restart="never" nodeType="tmRoot"/>
+      </p:par>
+    </p:tnLst>
+  </p:timing>
 </p:sld>
 </file>
 
@@ -4181,6 +5049,13 @@
   <p:clrMapOvr>
     <a:masterClrMapping/>
   </p:clrMapOvr>
+  <p:timing>
+    <p:tnLst>
+      <p:par>
+        <p:cTn xmlns:p14="http://schemas.microsoft.com/office/powerpoint/2010/main" id="1" dur="indefinite" restart="never" nodeType="tmRoot"/>
+      </p:par>
+    </p:tnLst>
+  </p:timing>
 </p:sld>
 </file>
 
@@ -4307,6 +5182,13 @@
   <p:clrMapOvr>
     <a:masterClrMapping/>
   </p:clrMapOvr>
+  <p:timing>
+    <p:tnLst>
+      <p:par>
+        <p:cTn xmlns:p14="http://schemas.microsoft.com/office/powerpoint/2010/main" id="1" dur="indefinite" restart="never" nodeType="tmRoot"/>
+      </p:par>
+    </p:tnLst>
+  </p:timing>
 </p:sld>
 </file>
 
@@ -4458,6 +5340,13 @@
   <p:clrMapOvr>
     <a:masterClrMapping/>
   </p:clrMapOvr>
+  <p:timing>
+    <p:tnLst>
+      <p:par>
+        <p:cTn xmlns:p14="http://schemas.microsoft.com/office/powerpoint/2010/main" id="1" dur="indefinite" restart="never" nodeType="tmRoot"/>
+      </p:par>
+    </p:tnLst>
+  </p:timing>
 </p:sld>
 </file>
 
@@ -4617,6 +5506,13 @@
   <p:clrMapOvr>
     <a:masterClrMapping/>
   </p:clrMapOvr>
+  <p:timing>
+    <p:tnLst>
+      <p:par>
+        <p:cTn xmlns:p14="http://schemas.microsoft.com/office/powerpoint/2010/main" id="1" dur="indefinite" restart="never" nodeType="tmRoot"/>
+      </p:par>
+    </p:tnLst>
+  </p:timing>
 </p:sld>
 </file>
 
@@ -4733,6 +5629,13 @@
   <p:clrMapOvr>
     <a:masterClrMapping/>
   </p:clrMapOvr>
+  <p:timing>
+    <p:tnLst>
+      <p:par>
+        <p:cTn xmlns:p14="http://schemas.microsoft.com/office/powerpoint/2010/main" id="1" dur="indefinite" restart="never" nodeType="tmRoot"/>
+      </p:par>
+    </p:tnLst>
+  </p:timing>
 </p:sld>
 </file>
 
@@ -4849,6 +5752,13 @@
   <p:clrMapOvr>
     <a:masterClrMapping/>
   </p:clrMapOvr>
+  <p:timing>
+    <p:tnLst>
+      <p:par>
+        <p:cTn xmlns:p14="http://schemas.microsoft.com/office/powerpoint/2010/main" id="1" dur="indefinite" restart="never" nodeType="tmRoot"/>
+      </p:par>
+    </p:tnLst>
+  </p:timing>
 </p:sld>
 </file>
 
@@ -4966,6 +5876,13 @@
   <p:clrMapOvr>
     <a:masterClrMapping/>
   </p:clrMapOvr>
+  <p:timing>
+    <p:tnLst>
+      <p:par>
+        <p:cTn xmlns:p14="http://schemas.microsoft.com/office/powerpoint/2010/main" id="1" dur="indefinite" restart="never" nodeType="tmRoot"/>
+      </p:par>
+    </p:tnLst>
+  </p:timing>
 </p:sld>
 </file>
 

</xml_diff>